<commit_message>
Edited day 2 review slides to be a little cleaner.
</commit_message>
<xml_diff>
--- a/2017/python/B Done - ish/day2-review.pptx
+++ b/2017/python/B Done - ish/day2-review.pptx
@@ -226,7 +226,7 @@
           <a:p>
             <a:fld id="{91BDCAE1-DC13-3545-841A-A4DBCAED93AF}" type="datetimeFigureOut">
               <a:rPr lang="en-US" smtClean="0"/>
-              <a:t>5/24/17</a:t>
+              <a:t>5/31/2017</a:t>
             </a:fld>
             <a:endParaRPr lang="en-US"/>
           </a:p>
@@ -598,6 +598,11 @@
         </p:txBody>
       </p:sp>
     </p:spTree>
+    <p:extLst>
+      <p:ext uri="{BB962C8B-B14F-4D97-AF65-F5344CB8AC3E}">
+        <p14:creationId xmlns:p14="http://schemas.microsoft.com/office/powerpoint/2010/main" val="3034941283"/>
+      </p:ext>
+    </p:extLst>
   </p:cSld>
   <p:clrMapOvr>
     <a:masterClrMapping/>
@@ -709,6 +714,11 @@
         </p:txBody>
       </p:sp>
     </p:spTree>
+    <p:extLst>
+      <p:ext uri="{BB962C8B-B14F-4D97-AF65-F5344CB8AC3E}">
+        <p14:creationId xmlns:p14="http://schemas.microsoft.com/office/powerpoint/2010/main" val="3052906736"/>
+      </p:ext>
+    </p:extLst>
   </p:cSld>
   <p:clrMapOvr>
     <a:masterClrMapping/>
@@ -820,6 +830,11 @@
         </p:txBody>
       </p:sp>
     </p:spTree>
+    <p:extLst>
+      <p:ext uri="{BB962C8B-B14F-4D97-AF65-F5344CB8AC3E}">
+        <p14:creationId xmlns:p14="http://schemas.microsoft.com/office/powerpoint/2010/main" val="4045234991"/>
+      </p:ext>
+    </p:extLst>
   </p:cSld>
   <p:clrMapOvr>
     <a:masterClrMapping/>
@@ -931,6 +946,11 @@
         </p:txBody>
       </p:sp>
     </p:spTree>
+    <p:extLst>
+      <p:ext uri="{BB962C8B-B14F-4D97-AF65-F5344CB8AC3E}">
+        <p14:creationId xmlns:p14="http://schemas.microsoft.com/office/powerpoint/2010/main" val="138821827"/>
+      </p:ext>
+    </p:extLst>
   </p:cSld>
   <p:clrMapOvr>
     <a:masterClrMapping/>
@@ -1042,6 +1062,11 @@
         </p:txBody>
       </p:sp>
     </p:spTree>
+    <p:extLst>
+      <p:ext uri="{BB962C8B-B14F-4D97-AF65-F5344CB8AC3E}">
+        <p14:creationId xmlns:p14="http://schemas.microsoft.com/office/powerpoint/2010/main" val="2189643892"/>
+      </p:ext>
+    </p:extLst>
   </p:cSld>
   <p:clrMapOvr>
     <a:masterClrMapping/>
@@ -1153,6 +1178,11 @@
         </p:txBody>
       </p:sp>
     </p:spTree>
+    <p:extLst>
+      <p:ext uri="{BB962C8B-B14F-4D97-AF65-F5344CB8AC3E}">
+        <p14:creationId xmlns:p14="http://schemas.microsoft.com/office/powerpoint/2010/main" val="3046462791"/>
+      </p:ext>
+    </p:extLst>
   </p:cSld>
   <p:clrMapOvr>
     <a:masterClrMapping/>
@@ -1264,6 +1294,11 @@
         </p:txBody>
       </p:sp>
     </p:spTree>
+    <p:extLst>
+      <p:ext uri="{BB962C8B-B14F-4D97-AF65-F5344CB8AC3E}">
+        <p14:creationId xmlns:p14="http://schemas.microsoft.com/office/powerpoint/2010/main" val="1764306385"/>
+      </p:ext>
+    </p:extLst>
   </p:cSld>
   <p:clrMapOvr>
     <a:masterClrMapping/>
@@ -1375,6 +1410,11 @@
         </p:txBody>
       </p:sp>
     </p:spTree>
+    <p:extLst>
+      <p:ext uri="{BB962C8B-B14F-4D97-AF65-F5344CB8AC3E}">
+        <p14:creationId xmlns:p14="http://schemas.microsoft.com/office/powerpoint/2010/main" val="1603460421"/>
+      </p:ext>
+    </p:extLst>
   </p:cSld>
   <p:clrMapOvr>
     <a:masterClrMapping/>
@@ -1486,6 +1526,11 @@
         </p:txBody>
       </p:sp>
     </p:spTree>
+    <p:extLst>
+      <p:ext uri="{BB962C8B-B14F-4D97-AF65-F5344CB8AC3E}">
+        <p14:creationId xmlns:p14="http://schemas.microsoft.com/office/powerpoint/2010/main" val="313835488"/>
+      </p:ext>
+    </p:extLst>
   </p:cSld>
   <p:clrMapOvr>
     <a:masterClrMapping/>
@@ -1597,6 +1642,11 @@
         </p:txBody>
       </p:sp>
     </p:spTree>
+    <p:extLst>
+      <p:ext uri="{BB962C8B-B14F-4D97-AF65-F5344CB8AC3E}">
+        <p14:creationId xmlns:p14="http://schemas.microsoft.com/office/powerpoint/2010/main" val="2384900118"/>
+      </p:ext>
+    </p:extLst>
   </p:cSld>
   <p:clrMapOvr>
     <a:masterClrMapping/>
@@ -1708,6 +1758,11 @@
         </p:txBody>
       </p:sp>
     </p:spTree>
+    <p:extLst>
+      <p:ext uri="{BB962C8B-B14F-4D97-AF65-F5344CB8AC3E}">
+        <p14:creationId xmlns:p14="http://schemas.microsoft.com/office/powerpoint/2010/main" val="1753150728"/>
+      </p:ext>
+    </p:extLst>
   </p:cSld>
   <p:clrMapOvr>
     <a:masterClrMapping/>
@@ -1819,6 +1874,11 @@
         </p:txBody>
       </p:sp>
     </p:spTree>
+    <p:extLst>
+      <p:ext uri="{BB962C8B-B14F-4D97-AF65-F5344CB8AC3E}">
+        <p14:creationId xmlns:p14="http://schemas.microsoft.com/office/powerpoint/2010/main" val="447221675"/>
+      </p:ext>
+    </p:extLst>
   </p:cSld>
   <p:clrMapOvr>
     <a:masterClrMapping/>
@@ -1930,6 +1990,11 @@
         </p:txBody>
       </p:sp>
     </p:spTree>
+    <p:extLst>
+      <p:ext uri="{BB962C8B-B14F-4D97-AF65-F5344CB8AC3E}">
+        <p14:creationId xmlns:p14="http://schemas.microsoft.com/office/powerpoint/2010/main" val="3578302259"/>
+      </p:ext>
+    </p:extLst>
   </p:cSld>
   <p:clrMapOvr>
     <a:masterClrMapping/>
@@ -2041,6 +2106,11 @@
         </p:txBody>
       </p:sp>
     </p:spTree>
+    <p:extLst>
+      <p:ext uri="{BB962C8B-B14F-4D97-AF65-F5344CB8AC3E}">
+        <p14:creationId xmlns:p14="http://schemas.microsoft.com/office/powerpoint/2010/main" val="3124371085"/>
+      </p:ext>
+    </p:extLst>
   </p:cSld>
   <p:clrMapOvr>
     <a:masterClrMapping/>
@@ -2152,6 +2222,11 @@
         </p:txBody>
       </p:sp>
     </p:spTree>
+    <p:extLst>
+      <p:ext uri="{BB962C8B-B14F-4D97-AF65-F5344CB8AC3E}">
+        <p14:creationId xmlns:p14="http://schemas.microsoft.com/office/powerpoint/2010/main" val="1945498219"/>
+      </p:ext>
+    </p:extLst>
   </p:cSld>
   <p:clrMapOvr>
     <a:masterClrMapping/>
@@ -2263,6 +2338,11 @@
         </p:txBody>
       </p:sp>
     </p:spTree>
+    <p:extLst>
+      <p:ext uri="{BB962C8B-B14F-4D97-AF65-F5344CB8AC3E}">
+        <p14:creationId xmlns:p14="http://schemas.microsoft.com/office/powerpoint/2010/main" val="3768753353"/>
+      </p:ext>
+    </p:extLst>
   </p:cSld>
   <p:clrMapOvr>
     <a:masterClrMapping/>
@@ -2374,6 +2454,11 @@
         </p:txBody>
       </p:sp>
     </p:spTree>
+    <p:extLst>
+      <p:ext uri="{BB962C8B-B14F-4D97-AF65-F5344CB8AC3E}">
+        <p14:creationId xmlns:p14="http://schemas.microsoft.com/office/powerpoint/2010/main" val="3876928790"/>
+      </p:ext>
+    </p:extLst>
   </p:cSld>
   <p:clrMapOvr>
     <a:masterClrMapping/>
@@ -2485,6 +2570,11 @@
         </p:txBody>
       </p:sp>
     </p:spTree>
+    <p:extLst>
+      <p:ext uri="{BB962C8B-B14F-4D97-AF65-F5344CB8AC3E}">
+        <p14:creationId xmlns:p14="http://schemas.microsoft.com/office/powerpoint/2010/main" val="3987200124"/>
+      </p:ext>
+    </p:extLst>
   </p:cSld>
   <p:clrMapOvr>
     <a:masterClrMapping/>
@@ -2673,7 +2763,7 @@
           <a:p>
             <a:fld id="{7C780E36-1438-D74D-8D9C-3089FABA7E39}" type="datetimeFigureOut">
               <a:rPr lang="en-US" smtClean="0"/>
-              <a:t>5/24/17</a:t>
+              <a:t>5/31/2017</a:t>
             </a:fld>
             <a:endParaRPr lang="en-US"/>
           </a:p>
@@ -2843,7 +2933,7 @@
           <a:p>
             <a:fld id="{7C780E36-1438-D74D-8D9C-3089FABA7E39}" type="datetimeFigureOut">
               <a:rPr lang="en-US" smtClean="0"/>
-              <a:t>5/24/17</a:t>
+              <a:t>5/31/2017</a:t>
             </a:fld>
             <a:endParaRPr lang="en-US"/>
           </a:p>
@@ -3023,7 +3113,7 @@
           <a:p>
             <a:fld id="{7C780E36-1438-D74D-8D9C-3089FABA7E39}" type="datetimeFigureOut">
               <a:rPr lang="en-US" smtClean="0"/>
-              <a:t>5/24/17</a:t>
+              <a:t>5/31/2017</a:t>
             </a:fld>
             <a:endParaRPr lang="en-US"/>
           </a:p>
@@ -3498,7 +3588,7 @@
           <a:p>
             <a:fld id="{7C780E36-1438-D74D-8D9C-3089FABA7E39}" type="datetimeFigureOut">
               <a:rPr lang="en-US" smtClean="0"/>
-              <a:t>5/24/17</a:t>
+              <a:t>5/31/2017</a:t>
             </a:fld>
             <a:endParaRPr lang="en-US"/>
           </a:p>
@@ -3744,7 +3834,7 @@
           <a:p>
             <a:fld id="{7C780E36-1438-D74D-8D9C-3089FABA7E39}" type="datetimeFigureOut">
               <a:rPr lang="en-US" smtClean="0"/>
-              <a:t>5/24/17</a:t>
+              <a:t>5/31/2017</a:t>
             </a:fld>
             <a:endParaRPr lang="en-US"/>
           </a:p>
@@ -4032,7 +4122,7 @@
           <a:p>
             <a:fld id="{7C780E36-1438-D74D-8D9C-3089FABA7E39}" type="datetimeFigureOut">
               <a:rPr lang="en-US" smtClean="0"/>
-              <a:t>5/24/17</a:t>
+              <a:t>5/31/2017</a:t>
             </a:fld>
             <a:endParaRPr lang="en-US"/>
           </a:p>
@@ -4454,7 +4544,7 @@
           <a:p>
             <a:fld id="{7C780E36-1438-D74D-8D9C-3089FABA7E39}" type="datetimeFigureOut">
               <a:rPr lang="en-US" smtClean="0"/>
-              <a:t>5/24/17</a:t>
+              <a:t>5/31/2017</a:t>
             </a:fld>
             <a:endParaRPr lang="en-US"/>
           </a:p>
@@ -4572,7 +4662,7 @@
           <a:p>
             <a:fld id="{7C780E36-1438-D74D-8D9C-3089FABA7E39}" type="datetimeFigureOut">
               <a:rPr lang="en-US" smtClean="0"/>
-              <a:t>5/24/17</a:t>
+              <a:t>5/31/2017</a:t>
             </a:fld>
             <a:endParaRPr lang="en-US"/>
           </a:p>
@@ -4667,7 +4757,7 @@
           <a:p>
             <a:fld id="{7C780E36-1438-D74D-8D9C-3089FABA7E39}" type="datetimeFigureOut">
               <a:rPr lang="en-US" smtClean="0"/>
-              <a:t>5/24/17</a:t>
+              <a:t>5/31/2017</a:t>
             </a:fld>
             <a:endParaRPr lang="en-US"/>
           </a:p>
@@ -4944,7 +5034,7 @@
           <a:p>
             <a:fld id="{7C780E36-1438-D74D-8D9C-3089FABA7E39}" type="datetimeFigureOut">
               <a:rPr lang="en-US" smtClean="0"/>
-              <a:t>5/24/17</a:t>
+              <a:t>5/31/2017</a:t>
             </a:fld>
             <a:endParaRPr lang="en-US"/>
           </a:p>
@@ -5197,7 +5287,7 @@
           <a:p>
             <a:fld id="{7C780E36-1438-D74D-8D9C-3089FABA7E39}" type="datetimeFigureOut">
               <a:rPr lang="en-US" smtClean="0"/>
-              <a:t>5/24/17</a:t>
+              <a:t>5/31/2017</a:t>
             </a:fld>
             <a:endParaRPr lang="en-US"/>
           </a:p>
@@ -5410,7 +5500,7 @@
           <a:p>
             <a:fld id="{7C780E36-1438-D74D-8D9C-3089FABA7E39}" type="datetimeFigureOut">
               <a:rPr lang="en-US" smtClean="0"/>
-              <a:t>5/24/17</a:t>
+              <a:t>5/31/2017</a:t>
             </a:fld>
             <a:endParaRPr lang="en-US"/>
           </a:p>
@@ -5870,11 +5960,7 @@
             </a:pPr>
             <a:r>
               <a:rPr lang="en-US" dirty="0" smtClean="0"/>
-              <a:t>HILT </a:t>
-            </a:r>
-            <a:r>
-              <a:rPr lang="en-US" dirty="0" smtClean="0"/>
-              <a:t>2017</a:t>
+              <a:t>HILT 2017</a:t>
             </a:r>
             <a:endParaRPr lang="en" dirty="0"/>
           </a:p>
@@ -6491,7 +6577,7 @@
               <a:buNone/>
             </a:pPr>
             <a:r>
-              <a:rPr lang="en-US" sz="7200" dirty="0" smtClean="0">
+              <a:rPr lang="en-US" sz="6600" dirty="0" smtClean="0">
                 <a:solidFill>
                   <a:srgbClr val="FF0000"/>
                 </a:solidFill>
@@ -6500,7 +6586,7 @@
               </a:rPr>
               <a:t>Impostor Syndrome</a:t>
             </a:r>
-            <a:endParaRPr lang="en" sz="7200" dirty="0">
+            <a:endParaRPr lang="en" sz="6600" dirty="0">
               <a:solidFill>
                 <a:srgbClr val="FF0000"/>
               </a:solidFill>
@@ -6705,7 +6791,7 @@
               <a:buNone/>
             </a:pPr>
             <a:r>
-              <a:rPr lang="en-US" sz="7200" dirty="0" smtClean="0">
+              <a:rPr lang="en-US" sz="5400" dirty="0" smtClean="0">
                 <a:solidFill>
                   <a:srgbClr val="FF0000"/>
                 </a:solidFill>
@@ -6714,7 +6800,7 @@
               </a:rPr>
               <a:t>Dunning-Kruger Effect</a:t>
             </a:r>
-            <a:endParaRPr lang="en" sz="7200" dirty="0">
+            <a:endParaRPr lang="en" sz="5400" dirty="0">
               <a:solidFill>
                 <a:srgbClr val="FF0000"/>
               </a:solidFill>
@@ -6857,7 +6943,7 @@
               <a:buNone/>
             </a:pPr>
             <a:r>
-              <a:rPr lang="en-US" sz="7200" dirty="0" smtClean="0">
+              <a:rPr lang="en-US" sz="6600" dirty="0" smtClean="0">
                 <a:solidFill>
                   <a:srgbClr val="FF0000"/>
                 </a:solidFill>
@@ -6866,7 +6952,7 @@
               </a:rPr>
               <a:t>Impostor Syndrome</a:t>
             </a:r>
-            <a:endParaRPr lang="en" sz="7200" dirty="0">
+            <a:endParaRPr lang="en" sz="6600" dirty="0">
               <a:solidFill>
                 <a:srgbClr val="FF0000"/>
               </a:solidFill>
@@ -7671,7 +7757,6 @@
               <a:rPr lang="en-US" dirty="0" smtClean="0"/>
               <a:t>Why Python? Why not?</a:t>
             </a:r>
-            <a:endParaRPr lang="en-US" dirty="0" smtClean="0"/>
           </a:p>
           <a:p>
             <a:pPr marL="457200" lvl="0" indent="-419100" rtl="0">
@@ -7844,11 +7929,7 @@
             </a:pPr>
             <a:r>
               <a:rPr lang="en-US" dirty="0" smtClean="0"/>
-              <a:t>What is </a:t>
-            </a:r>
-            <a:r>
-              <a:rPr lang="en-US" dirty="0" smtClean="0"/>
-              <a:t>the </a:t>
+              <a:t>What is the </a:t>
             </a:r>
             <a:r>
               <a:rPr lang="en-US" dirty="0"/>
@@ -7916,13 +7997,8 @@
             </a:pPr>
             <a:r>
               <a:rPr lang="en-US" dirty="0" smtClean="0"/>
-              <a:t>What is </a:t>
-            </a:r>
-            <a:r>
-              <a:rPr lang="en-US" dirty="0" smtClean="0"/>
-              <a:t>a list?</a:t>
-            </a:r>
-            <a:endParaRPr lang="en-US" dirty="0" smtClean="0"/>
+              <a:t>What is a list?</a:t>
+            </a:r>
           </a:p>
           <a:p>
             <a:pPr marL="457200" lvl="0" indent="-419100" rtl="0">
@@ -7941,13 +8017,8 @@
             </a:pPr>
             <a:r>
               <a:rPr lang="en-US" dirty="0" smtClean="0"/>
-              <a:t>What is </a:t>
-            </a:r>
-            <a:r>
-              <a:rPr lang="en-US" dirty="0" smtClean="0"/>
-              <a:t>a dictionary?</a:t>
-            </a:r>
-            <a:endParaRPr lang="en-US" dirty="0" smtClean="0"/>
+              <a:t>What is a dictionary?</a:t>
+            </a:r>
           </a:p>
         </p:txBody>
       </p:sp>
@@ -8086,7 +8157,6 @@
               <a:rPr lang="en-US" dirty="0" smtClean="0"/>
               <a:t>list and a dictionary?</a:t>
             </a:r>
-            <a:endParaRPr lang="en-US" dirty="0" smtClean="0"/>
           </a:p>
           <a:p>
             <a:pPr marL="457200" lvl="0" indent="-419100">

</xml_diff>